<commit_message>
Added calculation for Entropy of an unfair coin
</commit_message>
<xml_diff>
--- a/Presentation1.pptx
+++ b/Presentation1.pptx
@@ -6,6 +6,7 @@
   </p:sldMasterIdLst>
   <p:sldIdLst>
     <p:sldId id="257" r:id="rId2"/>
+    <p:sldId id="258" r:id="rId3"/>
   </p:sldIdLst>
   <p:sldSz cx="12192000" cy="6858000"/>
   <p:notesSz cx="6858000" cy="9144000"/>
@@ -104,7 +105,1455 @@
       </a:defRPr>
     </a:lvl9pPr>
   </p:defaultTextStyle>
+  <p:extLst>
+    <p:ext uri="{EFAFB233-063F-42B5-8137-9DF3F51BA10A}">
+      <p15:sldGuideLst xmlns:p15="http://schemas.microsoft.com/office/powerpoint/2012/main"/>
+    </p:ext>
+  </p:extLst>
 </p:presentation>
+</file>
+
+<file path=ppt/charts/chart1.xml><?xml version="1.0" encoding="utf-8"?>
+<c:chartSpace xmlns:c="http://schemas.openxmlformats.org/drawingml/2006/chart" xmlns:a="http://schemas.openxmlformats.org/drawingml/2006/main" xmlns:r="http://schemas.openxmlformats.org/officeDocument/2006/relationships">
+  <c:date1904 val="0"/>
+  <c:lang val="en-US"/>
+  <c:roundedCorners val="0"/>
+  <mc:AlternateContent xmlns:mc="http://schemas.openxmlformats.org/markup-compatibility/2006">
+    <mc:Choice xmlns:c14="http://schemas.microsoft.com/office/drawing/2007/8/2/chart" Requires="c14">
+      <c14:style val="102"/>
+    </mc:Choice>
+    <mc:Fallback>
+      <c:style val="2"/>
+    </mc:Fallback>
+  </mc:AlternateContent>
+  <c:chart>
+    <c:title>
+      <c:tx>
+        <c:rich>
+          <a:bodyPr rot="0" spcFirstLastPara="1" vertOverflow="ellipsis" vert="horz" wrap="square" anchor="ctr" anchorCtr="1"/>
+          <a:lstStyle/>
+          <a:p>
+            <a:pPr>
+              <a:defRPr sz="2500" b="1" i="0" u="none" strike="noStrike" kern="1200" spc="0" baseline="0">
+                <a:solidFill>
+                  <a:schemeClr val="tx1">
+                    <a:lumMod val="65000"/>
+                    <a:lumOff val="35000"/>
+                  </a:schemeClr>
+                </a:solidFill>
+                <a:latin typeface="+mn-lt"/>
+                <a:ea typeface="+mn-ea"/>
+                <a:cs typeface="+mn-cs"/>
+              </a:defRPr>
+            </a:pPr>
+            <a:r>
+              <a:rPr lang="en-US" sz="2500" b="1" dirty="0" smtClean="0"/>
+              <a:t>Entropy for an increasingly unfair</a:t>
+            </a:r>
+            <a:r>
+              <a:rPr lang="en-US" sz="2500" b="1" baseline="0" dirty="0" smtClean="0"/>
+              <a:t> coin</a:t>
+            </a:r>
+            <a:endParaRPr lang="en-US" sz="2500" b="1" dirty="0"/>
+          </a:p>
+        </c:rich>
+      </c:tx>
+      <c:layout/>
+      <c:overlay val="0"/>
+      <c:spPr>
+        <a:noFill/>
+        <a:ln>
+          <a:noFill/>
+        </a:ln>
+        <a:effectLst/>
+      </c:spPr>
+      <c:txPr>
+        <a:bodyPr rot="0" spcFirstLastPara="1" vertOverflow="ellipsis" vert="horz" wrap="square" anchor="ctr" anchorCtr="1"/>
+        <a:lstStyle/>
+        <a:p>
+          <a:pPr>
+            <a:defRPr sz="2500" b="1" i="0" u="none" strike="noStrike" kern="1200" spc="0" baseline="0">
+              <a:solidFill>
+                <a:schemeClr val="tx1">
+                  <a:lumMod val="65000"/>
+                  <a:lumOff val="35000"/>
+                </a:schemeClr>
+              </a:solidFill>
+              <a:latin typeface="+mn-lt"/>
+              <a:ea typeface="+mn-ea"/>
+              <a:cs typeface="+mn-cs"/>
+            </a:defRPr>
+          </a:pPr>
+          <a:endParaRPr lang="en-US"/>
+        </a:p>
+      </c:txPr>
+    </c:title>
+    <c:autoTitleDeleted val="0"/>
+    <c:plotArea>
+      <c:layout>
+        <c:manualLayout>
+          <c:layoutTarget val="inner"/>
+          <c:xMode val="edge"/>
+          <c:yMode val="edge"/>
+          <c:x val="7.2886482939632541E-2"/>
+          <c:y val="0.15782407407407409"/>
+          <c:w val="0.89655796150481193"/>
+          <c:h val="0.59199839603382909"/>
+        </c:manualLayout>
+      </c:layout>
+      <c:lineChart>
+        <c:grouping val="standard"/>
+        <c:varyColors val="0"/>
+        <c:ser>
+          <c:idx val="1"/>
+          <c:order val="0"/>
+          <c:spPr>
+            <a:ln w="28575" cap="rnd">
+              <a:solidFill>
+                <a:schemeClr val="accent2"/>
+              </a:solidFill>
+              <a:round/>
+            </a:ln>
+            <a:effectLst/>
+          </c:spPr>
+          <c:marker>
+            <c:symbol val="none"/>
+          </c:marker>
+          <c:cat>
+            <c:numRef>
+              <c:f>Sheet1!$B$2:$B$102</c:f>
+              <c:numCache>
+                <c:formatCode>General</c:formatCode>
+                <c:ptCount val="101"/>
+                <c:pt idx="0">
+                  <c:v>0.5</c:v>
+                </c:pt>
+                <c:pt idx="1">
+                  <c:v>0.505</c:v>
+                </c:pt>
+                <c:pt idx="2">
+                  <c:v>0.51</c:v>
+                </c:pt>
+                <c:pt idx="3">
+                  <c:v>0.51500000000000001</c:v>
+                </c:pt>
+                <c:pt idx="4">
+                  <c:v>0.52</c:v>
+                </c:pt>
+                <c:pt idx="5">
+                  <c:v>0.52500000000000002</c:v>
+                </c:pt>
+                <c:pt idx="6">
+                  <c:v>0.53</c:v>
+                </c:pt>
+                <c:pt idx="7">
+                  <c:v>0.53500000000000003</c:v>
+                </c:pt>
+                <c:pt idx="8">
+                  <c:v>0.54</c:v>
+                </c:pt>
+                <c:pt idx="9">
+                  <c:v>0.54500000000000004</c:v>
+                </c:pt>
+                <c:pt idx="10">
+                  <c:v>0.55000000000000004</c:v>
+                </c:pt>
+                <c:pt idx="11">
+                  <c:v>0.55500000000000005</c:v>
+                </c:pt>
+                <c:pt idx="12">
+                  <c:v>0.56000000000000005</c:v>
+                </c:pt>
+                <c:pt idx="13">
+                  <c:v>0.56499999999999995</c:v>
+                </c:pt>
+                <c:pt idx="14">
+                  <c:v>0.57000000000000006</c:v>
+                </c:pt>
+                <c:pt idx="15">
+                  <c:v>0.57499999999999996</c:v>
+                </c:pt>
+                <c:pt idx="16">
+                  <c:v>0.57999999999999996</c:v>
+                </c:pt>
+                <c:pt idx="17">
+                  <c:v>0.58499999999999996</c:v>
+                </c:pt>
+                <c:pt idx="18">
+                  <c:v>0.59</c:v>
+                </c:pt>
+                <c:pt idx="19">
+                  <c:v>0.59499999999999997</c:v>
+                </c:pt>
+                <c:pt idx="20">
+                  <c:v>0.6</c:v>
+                </c:pt>
+                <c:pt idx="21">
+                  <c:v>0.60499999999999998</c:v>
+                </c:pt>
+                <c:pt idx="22">
+                  <c:v>0.61</c:v>
+                </c:pt>
+                <c:pt idx="23">
+                  <c:v>0.61499999999999999</c:v>
+                </c:pt>
+                <c:pt idx="24">
+                  <c:v>0.62</c:v>
+                </c:pt>
+                <c:pt idx="25">
+                  <c:v>0.625</c:v>
+                </c:pt>
+                <c:pt idx="26">
+                  <c:v>0.63</c:v>
+                </c:pt>
+                <c:pt idx="27">
+                  <c:v>0.63500000000000001</c:v>
+                </c:pt>
+                <c:pt idx="28">
+                  <c:v>0.64</c:v>
+                </c:pt>
+                <c:pt idx="29">
+                  <c:v>0.64500000000000002</c:v>
+                </c:pt>
+                <c:pt idx="30">
+                  <c:v>0.65</c:v>
+                </c:pt>
+                <c:pt idx="31">
+                  <c:v>0.65500000000000003</c:v>
+                </c:pt>
+                <c:pt idx="32">
+                  <c:v>0.66</c:v>
+                </c:pt>
+                <c:pt idx="33">
+                  <c:v>0.66500000000000004</c:v>
+                </c:pt>
+                <c:pt idx="34">
+                  <c:v>0.67</c:v>
+                </c:pt>
+                <c:pt idx="35">
+                  <c:v>0.67500000000000004</c:v>
+                </c:pt>
+                <c:pt idx="36">
+                  <c:v>0.67999999999999994</c:v>
+                </c:pt>
+                <c:pt idx="37">
+                  <c:v>0.68500000000000005</c:v>
+                </c:pt>
+                <c:pt idx="38">
+                  <c:v>0.69</c:v>
+                </c:pt>
+                <c:pt idx="39">
+                  <c:v>0.69500000000000006</c:v>
+                </c:pt>
+                <c:pt idx="40">
+                  <c:v>0.7</c:v>
+                </c:pt>
+                <c:pt idx="41">
+                  <c:v>0.70500000000000007</c:v>
+                </c:pt>
+                <c:pt idx="42">
+                  <c:v>0.71</c:v>
+                </c:pt>
+                <c:pt idx="43">
+                  <c:v>0.71499999999999997</c:v>
+                </c:pt>
+                <c:pt idx="44">
+                  <c:v>0.72</c:v>
+                </c:pt>
+                <c:pt idx="45">
+                  <c:v>0.72499999999999998</c:v>
+                </c:pt>
+                <c:pt idx="46">
+                  <c:v>0.73</c:v>
+                </c:pt>
+                <c:pt idx="47">
+                  <c:v>0.73499999999999999</c:v>
+                </c:pt>
+                <c:pt idx="48">
+                  <c:v>0.74</c:v>
+                </c:pt>
+                <c:pt idx="49">
+                  <c:v>0.745</c:v>
+                </c:pt>
+                <c:pt idx="50">
+                  <c:v>0.75</c:v>
+                </c:pt>
+                <c:pt idx="51">
+                  <c:v>0.755</c:v>
+                </c:pt>
+                <c:pt idx="52">
+                  <c:v>0.76</c:v>
+                </c:pt>
+                <c:pt idx="53">
+                  <c:v>0.76500000000000001</c:v>
+                </c:pt>
+                <c:pt idx="54">
+                  <c:v>0.77</c:v>
+                </c:pt>
+                <c:pt idx="55">
+                  <c:v>0.77500000000000002</c:v>
+                </c:pt>
+                <c:pt idx="56">
+                  <c:v>0.78</c:v>
+                </c:pt>
+                <c:pt idx="57">
+                  <c:v>0.78500000000000003</c:v>
+                </c:pt>
+                <c:pt idx="58">
+                  <c:v>0.79</c:v>
+                </c:pt>
+                <c:pt idx="59">
+                  <c:v>0.79499999999999993</c:v>
+                </c:pt>
+                <c:pt idx="60">
+                  <c:v>0.8</c:v>
+                </c:pt>
+                <c:pt idx="61">
+                  <c:v>0.80499999999999994</c:v>
+                </c:pt>
+                <c:pt idx="62">
+                  <c:v>0.81</c:v>
+                </c:pt>
+                <c:pt idx="63">
+                  <c:v>0.81499999999999995</c:v>
+                </c:pt>
+                <c:pt idx="64">
+                  <c:v>0.82000000000000006</c:v>
+                </c:pt>
+                <c:pt idx="65">
+                  <c:v>0.82499999999999996</c:v>
+                </c:pt>
+                <c:pt idx="66">
+                  <c:v>0.83000000000000007</c:v>
+                </c:pt>
+                <c:pt idx="67">
+                  <c:v>0.83499999999999996</c:v>
+                </c:pt>
+                <c:pt idx="68">
+                  <c:v>0.84000000000000008</c:v>
+                </c:pt>
+                <c:pt idx="69">
+                  <c:v>0.84499999999999997</c:v>
+                </c:pt>
+                <c:pt idx="70">
+                  <c:v>0.85000000000000009</c:v>
+                </c:pt>
+                <c:pt idx="71">
+                  <c:v>0.85499999999999998</c:v>
+                </c:pt>
+                <c:pt idx="72">
+                  <c:v>0.86</c:v>
+                </c:pt>
+                <c:pt idx="73">
+                  <c:v>0.86499999999999999</c:v>
+                </c:pt>
+                <c:pt idx="74">
+                  <c:v>0.87</c:v>
+                </c:pt>
+                <c:pt idx="75">
+                  <c:v>0.875</c:v>
+                </c:pt>
+                <c:pt idx="76">
+                  <c:v>0.88</c:v>
+                </c:pt>
+                <c:pt idx="77">
+                  <c:v>0.88500000000000001</c:v>
+                </c:pt>
+                <c:pt idx="78">
+                  <c:v>0.89</c:v>
+                </c:pt>
+                <c:pt idx="79">
+                  <c:v>0.89500000000000002</c:v>
+                </c:pt>
+                <c:pt idx="80">
+                  <c:v>0.9</c:v>
+                </c:pt>
+                <c:pt idx="81">
+                  <c:v>0.90500000000000003</c:v>
+                </c:pt>
+                <c:pt idx="82">
+                  <c:v>0.91</c:v>
+                </c:pt>
+                <c:pt idx="83">
+                  <c:v>0.91500000000000004</c:v>
+                </c:pt>
+                <c:pt idx="84">
+                  <c:v>0.91999999999999993</c:v>
+                </c:pt>
+                <c:pt idx="85">
+                  <c:v>0.92500000000000004</c:v>
+                </c:pt>
+                <c:pt idx="86">
+                  <c:v>0.92999999999999994</c:v>
+                </c:pt>
+                <c:pt idx="87">
+                  <c:v>0.93500000000000005</c:v>
+                </c:pt>
+                <c:pt idx="88">
+                  <c:v>0.94</c:v>
+                </c:pt>
+                <c:pt idx="89">
+                  <c:v>0.94500000000000006</c:v>
+                </c:pt>
+                <c:pt idx="90">
+                  <c:v>0.95</c:v>
+                </c:pt>
+                <c:pt idx="91">
+                  <c:v>0.95500000000000007</c:v>
+                </c:pt>
+                <c:pt idx="92">
+                  <c:v>0.96</c:v>
+                </c:pt>
+                <c:pt idx="93">
+                  <c:v>0.96500000000000008</c:v>
+                </c:pt>
+                <c:pt idx="94">
+                  <c:v>0.97</c:v>
+                </c:pt>
+                <c:pt idx="95">
+                  <c:v>0.97500000000000009</c:v>
+                </c:pt>
+                <c:pt idx="96">
+                  <c:v>0.98</c:v>
+                </c:pt>
+                <c:pt idx="97">
+                  <c:v>0.98499999999999999</c:v>
+                </c:pt>
+                <c:pt idx="98">
+                  <c:v>0.99</c:v>
+                </c:pt>
+                <c:pt idx="99">
+                  <c:v>0.995</c:v>
+                </c:pt>
+                <c:pt idx="100">
+                  <c:v>1</c:v>
+                </c:pt>
+              </c:numCache>
+            </c:numRef>
+          </c:cat>
+          <c:val>
+            <c:numRef>
+              <c:f>Sheet1!$D$2:$D$102</c:f>
+              <c:numCache>
+                <c:formatCode>General</c:formatCode>
+                <c:ptCount val="101"/>
+                <c:pt idx="0">
+                  <c:v>1</c:v>
+                </c:pt>
+                <c:pt idx="1">
+                  <c:v>0.99992786404566147</c:v>
+                </c:pt>
+                <c:pt idx="2">
+                  <c:v>0.9997114417528099</c:v>
+                </c:pt>
+                <c:pt idx="3">
+                  <c:v>0.9993506898146105</c:v>
+                </c:pt>
+                <c:pt idx="4">
+                  <c:v>0.99884553599520176</c:v>
+                </c:pt>
+                <c:pt idx="5">
+                  <c:v>0.99819587904281004</c:v>
+                </c:pt>
+                <c:pt idx="6">
+                  <c:v>0.99740158856773964</c:v>
+                </c:pt>
+                <c:pt idx="7">
+                  <c:v>0.99646250488487653</c:v>
+                </c:pt>
+                <c:pt idx="8">
+                  <c:v>0.99537843882022581</c:v>
+                </c:pt>
+                <c:pt idx="9">
+                  <c:v>0.99414917148089299</c:v>
+                </c:pt>
+                <c:pt idx="10">
+                  <c:v>0.99277445398780839</c:v>
+                </c:pt>
+                <c:pt idx="11">
+                  <c:v>0.99125400717036893</c:v>
+                </c:pt>
+                <c:pt idx="12">
+                  <c:v>0.98958752122205573</c:v>
+                </c:pt>
+                <c:pt idx="13">
+                  <c:v>0.98777465531594688</c:v>
+                </c:pt>
+                <c:pt idx="14">
+                  <c:v>0.98581503717891983</c:v>
+                </c:pt>
+                <c:pt idx="15">
+                  <c:v>0.98370826262318567</c:v>
+                </c:pt>
+                <c:pt idx="16">
+                  <c:v>0.98145389503365366</c:v>
+                </c:pt>
+                <c:pt idx="17">
+                  <c:v>0.97905146480945937</c:v>
+                </c:pt>
+                <c:pt idx="18">
+                  <c:v>0.97650046875782415</c:v>
+                </c:pt>
+                <c:pt idx="19">
+                  <c:v>0.97380036943822534</c:v>
+                </c:pt>
+                <c:pt idx="20">
+                  <c:v>0.97095059445466858</c:v>
+                </c:pt>
+                <c:pt idx="21">
+                  <c:v>0.96795053569363942</c:v>
+                </c:pt>
+                <c:pt idx="22">
+                  <c:v>0.9647995485050872</c:v>
+                </c:pt>
+                <c:pt idx="23">
+                  <c:v>0.96149695082355513</c:v>
+                </c:pt>
+                <c:pt idx="24">
+                  <c:v>0.95804202222629953</c:v>
+                </c:pt>
+                <c:pt idx="25">
+                  <c:v>0.95443400292496494</c:v>
+                </c:pt>
+                <c:pt idx="26">
+                  <c:v>0.95067209268706587</c:v>
+                </c:pt>
+                <c:pt idx="27">
+                  <c:v>0.94675544968319314</c:v>
+                </c:pt>
+                <c:pt idx="28">
+                  <c:v>0.94268318925549222</c:v>
+                </c:pt>
+                <c:pt idx="29">
+                  <c:v>0.93845438260256375</c:v>
+                </c:pt>
+                <c:pt idx="30">
+                  <c:v>0.93406805537549098</c:v>
+                </c:pt>
+                <c:pt idx="31">
+                  <c:v>0.92952318617922636</c:v>
+                </c:pt>
+                <c:pt idx="32">
+                  <c:v>0.92481870497302998</c:v>
+                </c:pt>
+                <c:pt idx="33">
+                  <c:v>0.91995349136307991</c:v>
+                </c:pt>
+                <c:pt idx="34">
+                  <c:v>0.91492637277972755</c:v>
+                </c:pt>
+                <c:pt idx="35">
+                  <c:v>0.90973612253116609</c:v>
+                </c:pt>
+                <c:pt idx="36">
+                  <c:v>0.90438145772449396</c:v>
+                </c:pt>
+                <c:pt idx="37">
+                  <c:v>0.89886103704429021</c:v>
+                </c:pt>
+                <c:pt idx="38">
+                  <c:v>0.89317345837785678</c:v>
+                </c:pt>
+                <c:pt idx="39">
+                  <c:v>0.88731725627520674</c:v>
+                </c:pt>
+                <c:pt idx="40">
+                  <c:v>0.8812908992306927</c:v>
+                </c:pt>
+                <c:pt idx="41">
+                  <c:v>0.875092786771832</c:v>
+                </c:pt>
+                <c:pt idx="42">
+                  <c:v>0.86872124633940462</c:v>
+                </c:pt>
+                <c:pt idx="43">
+                  <c:v>0.86217452994122501</c:v>
+                </c:pt>
+                <c:pt idx="44">
+                  <c:v>0.85545081056013073</c:v>
+                </c:pt>
+                <c:pt idx="45">
+                  <c:v>0.84854817829461582</c:v>
+                </c:pt>
+                <c:pt idx="46">
+                  <c:v>0.84146463620817569</c:v>
+                </c:pt>
+                <c:pt idx="47">
+                  <c:v>0.83419809586074922</c:v>
+                </c:pt>
+                <c:pt idx="48">
+                  <c:v>0.82674637249261784</c:v>
+                </c:pt>
+                <c:pt idx="49">
+                  <c:v>0.819107179827683</c:v>
+                </c:pt>
+                <c:pt idx="50">
+                  <c:v>0.81127812445913283</c:v>
+                </c:pt>
+                <c:pt idx="51">
+                  <c:v>0.80325669977606418</c:v>
+                </c:pt>
+                <c:pt idx="52">
+                  <c:v>0.79504027938452226</c:v>
+                </c:pt>
+                <c:pt idx="53">
+                  <c:v>0.78662610997060123</c:v>
+                </c:pt>
+                <c:pt idx="54">
+                  <c:v>0.77801130354653758</c:v>
+                </c:pt>
+                <c:pt idx="55">
+                  <c:v>0.76919282901301367</c:v>
+                </c:pt>
+                <c:pt idx="56">
+                  <c:v>0.76016750296196567</c:v>
+                </c:pt>
+                <c:pt idx="57">
+                  <c:v>0.75093197963384639</c:v>
+                </c:pt>
+                <c:pt idx="58">
+                  <c:v>0.74148273993127356</c:v>
+                </c:pt>
+                <c:pt idx="59">
+                  <c:v>0.73181607937695525</c:v>
+                </c:pt>
+                <c:pt idx="60">
+                  <c:v>0.72192809488736231</c:v>
+                </c:pt>
+                <c:pt idx="61">
+                  <c:v>0.71181467021431977</c:v>
+                </c:pt>
+                <c:pt idx="62">
+                  <c:v>0.70147145988389736</c:v>
+                </c:pt>
+                <c:pt idx="63">
+                  <c:v>0.690893871435041</c:v>
+                </c:pt>
+                <c:pt idx="64">
+                  <c:v>0.68007704572827976</c:v>
+                </c:pt>
+                <c:pt idx="65">
+                  <c:v>0.66901583505655771</c:v>
+                </c:pt>
+                <c:pt idx="66">
+                  <c:v>0.65770477874421929</c:v>
+                </c:pt>
+                <c:pt idx="67">
+                  <c:v>0.64613807586474636</c:v>
+                </c:pt>
+                <c:pt idx="68">
+                  <c:v>0.63430955464056593</c:v>
+                </c:pt>
+                <c:pt idx="69">
+                  <c:v>0.62221263800631332</c:v>
+                </c:pt>
+                <c:pt idx="70">
+                  <c:v>0.60984030471640016</c:v>
+                </c:pt>
+                <c:pt idx="71">
+                  <c:v>0.59718504525378413</c:v>
+                </c:pt>
+                <c:pt idx="72">
+                  <c:v>0.58423881164285596</c:v>
+                </c:pt>
+                <c:pt idx="73">
+                  <c:v>0.57099296007688971</c:v>
+                </c:pt>
+                <c:pt idx="74">
+                  <c:v>0.55743818502798914</c:v>
+                </c:pt>
+                <c:pt idx="75">
+                  <c:v>0.5435644431995964</c:v>
+                </c:pt>
+                <c:pt idx="76">
+                  <c:v>0.52936086528736437</c:v>
+                </c:pt>
+                <c:pt idx="77">
+                  <c:v>0.51481565300471555</c:v>
+                </c:pt>
+                <c:pt idx="78">
+                  <c:v>0.499915958164528</c:v>
+                </c:pt>
+                <c:pt idx="79">
+                  <c:v>0.48464773973144526</c:v>
+                </c:pt>
+                <c:pt idx="80">
+                  <c:v>0.46899559358928117</c:v>
+                </c:pt>
+                <c:pt idx="81">
+                  <c:v>0.45294254818728313</c:v>
+                </c:pt>
+                <c:pt idx="82">
+                  <c:v>0.43646981706410282</c:v>
+                </c:pt>
+                <c:pt idx="83">
+                  <c:v>0.41955649623854691</c:v>
+                </c:pt>
+                <c:pt idx="84">
+                  <c:v>0.40217919020227316</c:v>
+                </c:pt>
+                <c:pt idx="85">
+                  <c:v>0.38431154412649693</c:v>
+                </c:pt>
+                <c:pt idx="86">
+                  <c:v>0.36592365090022344</c:v>
+                </c:pt>
+                <c:pt idx="87">
+                  <c:v>0.34698128810061324</c:v>
+                </c:pt>
+                <c:pt idx="88">
+                  <c:v>0.32744491915447643</c:v>
+                </c:pt>
+                <c:pt idx="89">
+                  <c:v>0.30726835986075945</c:v>
+                </c:pt>
+                <c:pt idx="90">
+                  <c:v>0.28639695711595631</c:v>
+                </c:pt>
+                <c:pt idx="91">
+                  <c:v>0.26476503393568035</c:v>
+                </c:pt>
+                <c:pt idx="92">
+                  <c:v>0.24229218908241493</c:v>
+                </c:pt>
+                <c:pt idx="93">
+                  <c:v>0.21887772653901058</c:v>
+                </c:pt>
+                <c:pt idx="94">
+                  <c:v>0.19439185783157631</c:v>
+                </c:pt>
+                <c:pt idx="95">
+                  <c:v>0.16866093149666977</c:v>
+                </c:pt>
+                <c:pt idx="96">
+                  <c:v>0.14144054254182076</c:v>
+                </c:pt>
+                <c:pt idx="97">
+                  <c:v>0.11236071009937681</c:v>
+                </c:pt>
+                <c:pt idx="98">
+                  <c:v>8.0793135895911236E-2</c:v>
+                </c:pt>
+                <c:pt idx="99">
+                  <c:v>4.5414692333794138E-2</c:v>
+                </c:pt>
+                <c:pt idx="100">
+                  <c:v>0</c:v>
+                </c:pt>
+              </c:numCache>
+            </c:numRef>
+          </c:val>
+          <c:smooth val="0"/>
+        </c:ser>
+        <c:dLbls>
+          <c:showLegendKey val="0"/>
+          <c:showVal val="0"/>
+          <c:showCatName val="0"/>
+          <c:showSerName val="0"/>
+          <c:showPercent val="0"/>
+          <c:showBubbleSize val="0"/>
+        </c:dLbls>
+        <c:smooth val="0"/>
+        <c:axId val="391763392"/>
+        <c:axId val="305258376"/>
+      </c:lineChart>
+      <c:catAx>
+        <c:axId val="391763392"/>
+        <c:scaling>
+          <c:orientation val="minMax"/>
+        </c:scaling>
+        <c:delete val="0"/>
+        <c:axPos val="b"/>
+        <c:numFmt formatCode="General" sourceLinked="0"/>
+        <c:majorTickMark val="none"/>
+        <c:minorTickMark val="none"/>
+        <c:tickLblPos val="nextTo"/>
+        <c:spPr>
+          <a:noFill/>
+          <a:ln w="9525" cap="flat" cmpd="sng" algn="ctr">
+            <a:solidFill>
+              <a:schemeClr val="tx1">
+                <a:lumMod val="15000"/>
+                <a:lumOff val="85000"/>
+              </a:schemeClr>
+            </a:solidFill>
+            <a:round/>
+          </a:ln>
+          <a:effectLst/>
+        </c:spPr>
+        <c:txPr>
+          <a:bodyPr rot="3360000" spcFirstLastPara="1" vertOverflow="ellipsis" wrap="square" anchor="ctr" anchorCtr="1"/>
+          <a:lstStyle/>
+          <a:p>
+            <a:pPr>
+              <a:defRPr sz="900" b="0" i="0" u="none" strike="noStrike" kern="1200" baseline="0">
+                <a:solidFill>
+                  <a:schemeClr val="tx1">
+                    <a:lumMod val="65000"/>
+                    <a:lumOff val="35000"/>
+                  </a:schemeClr>
+                </a:solidFill>
+                <a:latin typeface="+mn-lt"/>
+                <a:ea typeface="+mn-ea"/>
+                <a:cs typeface="+mn-cs"/>
+              </a:defRPr>
+            </a:pPr>
+            <a:endParaRPr lang="en-US"/>
+          </a:p>
+        </c:txPr>
+        <c:crossAx val="305258376"/>
+        <c:crosses val="autoZero"/>
+        <c:auto val="0"/>
+        <c:lblAlgn val="ctr"/>
+        <c:lblOffset val="100"/>
+        <c:noMultiLvlLbl val="0"/>
+      </c:catAx>
+      <c:valAx>
+        <c:axId val="305258376"/>
+        <c:scaling>
+          <c:orientation val="minMax"/>
+          <c:max val="1"/>
+        </c:scaling>
+        <c:delete val="0"/>
+        <c:axPos val="l"/>
+        <c:majorGridlines>
+          <c:spPr>
+            <a:ln w="9525" cap="flat" cmpd="sng" algn="ctr">
+              <a:solidFill>
+                <a:schemeClr val="tx1">
+                  <a:lumMod val="15000"/>
+                  <a:lumOff val="85000"/>
+                </a:schemeClr>
+              </a:solidFill>
+              <a:round/>
+            </a:ln>
+            <a:effectLst/>
+          </c:spPr>
+        </c:majorGridlines>
+        <c:numFmt formatCode="General" sourceLinked="1"/>
+        <c:majorTickMark val="none"/>
+        <c:minorTickMark val="none"/>
+        <c:tickLblPos val="nextTo"/>
+        <c:spPr>
+          <a:noFill/>
+          <a:ln>
+            <a:noFill/>
+          </a:ln>
+          <a:effectLst/>
+        </c:spPr>
+        <c:txPr>
+          <a:bodyPr rot="-60000000" spcFirstLastPara="1" vertOverflow="ellipsis" vert="horz" wrap="square" anchor="ctr" anchorCtr="1"/>
+          <a:lstStyle/>
+          <a:p>
+            <a:pPr>
+              <a:defRPr sz="900" b="0" i="0" u="none" strike="noStrike" kern="1200" baseline="0">
+                <a:solidFill>
+                  <a:schemeClr val="tx1">
+                    <a:lumMod val="65000"/>
+                    <a:lumOff val="35000"/>
+                  </a:schemeClr>
+                </a:solidFill>
+                <a:latin typeface="+mn-lt"/>
+                <a:ea typeface="+mn-ea"/>
+                <a:cs typeface="+mn-cs"/>
+              </a:defRPr>
+            </a:pPr>
+            <a:endParaRPr lang="en-US"/>
+          </a:p>
+        </c:txPr>
+        <c:crossAx val="391763392"/>
+        <c:crosses val="autoZero"/>
+        <c:crossBetween val="midCat"/>
+      </c:valAx>
+      <c:spPr>
+        <a:noFill/>
+        <a:ln>
+          <a:noFill/>
+        </a:ln>
+        <a:effectLst/>
+      </c:spPr>
+    </c:plotArea>
+    <c:plotVisOnly val="1"/>
+    <c:dispBlanksAs val="gap"/>
+    <c:showDLblsOverMax val="0"/>
+  </c:chart>
+  <c:spPr>
+    <a:noFill/>
+    <a:ln>
+      <a:noFill/>
+    </a:ln>
+    <a:effectLst/>
+  </c:spPr>
+  <c:txPr>
+    <a:bodyPr/>
+    <a:lstStyle/>
+    <a:p>
+      <a:pPr>
+        <a:defRPr/>
+      </a:pPr>
+      <a:endParaRPr lang="en-US"/>
+    </a:p>
+  </c:txPr>
+  <c:externalData r:id="rId3">
+    <c:autoUpdate val="0"/>
+  </c:externalData>
+</c:chartSpace>
+</file>
+
+<file path=ppt/charts/colors1.xml><?xml version="1.0" encoding="utf-8"?>
+<cs:colorStyle xmlns:cs="http://schemas.microsoft.com/office/drawing/2012/chartStyle" xmlns:a="http://schemas.openxmlformats.org/drawingml/2006/main" meth="cycle" id="10">
+  <a:schemeClr val="accent1"/>
+  <a:schemeClr val="accent2"/>
+  <a:schemeClr val="accent3"/>
+  <a:schemeClr val="accent4"/>
+  <a:schemeClr val="accent5"/>
+  <a:schemeClr val="accent6"/>
+  <cs:variation/>
+  <cs:variation>
+    <a:lumMod val="60000"/>
+  </cs:variation>
+  <cs:variation>
+    <a:lumMod val="80000"/>
+    <a:lumOff val="20000"/>
+  </cs:variation>
+  <cs:variation>
+    <a:lumMod val="80000"/>
+  </cs:variation>
+  <cs:variation>
+    <a:lumMod val="60000"/>
+    <a:lumOff val="40000"/>
+  </cs:variation>
+  <cs:variation>
+    <a:lumMod val="50000"/>
+  </cs:variation>
+  <cs:variation>
+    <a:lumMod val="70000"/>
+    <a:lumOff val="30000"/>
+  </cs:variation>
+  <cs:variation>
+    <a:lumMod val="70000"/>
+  </cs:variation>
+  <cs:variation>
+    <a:lumMod val="50000"/>
+    <a:lumOff val="50000"/>
+  </cs:variation>
+</cs:colorStyle>
+</file>
+
+<file path=ppt/charts/style1.xml><?xml version="1.0" encoding="utf-8"?>
+<cs:chartStyle xmlns:cs="http://schemas.microsoft.com/office/drawing/2012/chartStyle" xmlns:a="http://schemas.openxmlformats.org/drawingml/2006/main" id="227">
+  <cs:axisTitle>
+    <cs:lnRef idx="0"/>
+    <cs:fillRef idx="0"/>
+    <cs:effectRef idx="0"/>
+    <cs:fontRef idx="minor">
+      <a:schemeClr val="tx1">
+        <a:lumMod val="65000"/>
+        <a:lumOff val="35000"/>
+      </a:schemeClr>
+    </cs:fontRef>
+    <cs:defRPr sz="1000" kern="1200"/>
+  </cs:axisTitle>
+  <cs:categoryAxis>
+    <cs:lnRef idx="0"/>
+    <cs:fillRef idx="0"/>
+    <cs:effectRef idx="0"/>
+    <cs:fontRef idx="minor">
+      <a:schemeClr val="tx1">
+        <a:lumMod val="65000"/>
+        <a:lumOff val="35000"/>
+      </a:schemeClr>
+    </cs:fontRef>
+    <cs:spPr>
+      <a:ln w="9525" cap="flat" cmpd="sng" algn="ctr">
+        <a:solidFill>
+          <a:schemeClr val="tx1">
+            <a:lumMod val="15000"/>
+            <a:lumOff val="85000"/>
+          </a:schemeClr>
+        </a:solidFill>
+        <a:round/>
+      </a:ln>
+    </cs:spPr>
+    <cs:defRPr sz="900" kern="1200"/>
+  </cs:categoryAxis>
+  <cs:chartArea mods="allowNoFillOverride allowNoLineOverride">
+    <cs:lnRef idx="0"/>
+    <cs:fillRef idx="0"/>
+    <cs:effectRef idx="0"/>
+    <cs:fontRef idx="minor">
+      <a:schemeClr val="tx1"/>
+    </cs:fontRef>
+    <cs:spPr>
+      <a:solidFill>
+        <a:schemeClr val="bg1"/>
+      </a:solidFill>
+      <a:ln w="9525" cap="flat" cmpd="sng" algn="ctr">
+        <a:solidFill>
+          <a:schemeClr val="tx1">
+            <a:lumMod val="15000"/>
+            <a:lumOff val="85000"/>
+          </a:schemeClr>
+        </a:solidFill>
+        <a:round/>
+      </a:ln>
+    </cs:spPr>
+    <cs:defRPr sz="1000" kern="1200"/>
+  </cs:chartArea>
+  <cs:dataLabel>
+    <cs:lnRef idx="0"/>
+    <cs:fillRef idx="0"/>
+    <cs:effectRef idx="0"/>
+    <cs:fontRef idx="minor">
+      <a:schemeClr val="tx1">
+        <a:lumMod val="75000"/>
+        <a:lumOff val="25000"/>
+      </a:schemeClr>
+    </cs:fontRef>
+    <cs:defRPr sz="900" kern="1200"/>
+  </cs:dataLabel>
+  <cs:dataLabelCallout>
+    <cs:lnRef idx="0"/>
+    <cs:fillRef idx="0"/>
+    <cs:effectRef idx="0"/>
+    <cs:fontRef idx="minor">
+      <a:schemeClr val="dk1">
+        <a:lumMod val="65000"/>
+        <a:lumOff val="35000"/>
+      </a:schemeClr>
+    </cs:fontRef>
+    <cs:spPr>
+      <a:solidFill>
+        <a:schemeClr val="lt1"/>
+      </a:solidFill>
+      <a:ln>
+        <a:solidFill>
+          <a:schemeClr val="dk1">
+            <a:lumMod val="25000"/>
+            <a:lumOff val="75000"/>
+          </a:schemeClr>
+        </a:solidFill>
+      </a:ln>
+    </cs:spPr>
+    <cs:defRPr sz="900" kern="1200"/>
+    <cs:bodyPr rot="0" spcFirstLastPara="1" vertOverflow="clip" horzOverflow="clip" vert="horz" wrap="square" lIns="36576" tIns="18288" rIns="36576" bIns="18288" anchor="ctr" anchorCtr="1">
+      <a:spAutoFit/>
+    </cs:bodyPr>
+  </cs:dataLabelCallout>
+  <cs:dataPoint>
+    <cs:lnRef idx="0"/>
+    <cs:fillRef idx="1">
+      <cs:styleClr val="auto"/>
+    </cs:fillRef>
+    <cs:effectRef idx="0"/>
+    <cs:fontRef idx="minor">
+      <a:schemeClr val="tx1"/>
+    </cs:fontRef>
+    <cs:spPr>
+      <a:solidFill>
+        <a:schemeClr val="phClr"/>
+      </a:solidFill>
+    </cs:spPr>
+  </cs:dataPoint>
+  <cs:dataPoint3D>
+    <cs:lnRef idx="0"/>
+    <cs:fillRef idx="1">
+      <cs:styleClr val="auto"/>
+    </cs:fillRef>
+    <cs:effectRef idx="0"/>
+    <cs:fontRef idx="minor">
+      <a:schemeClr val="tx1"/>
+    </cs:fontRef>
+    <cs:spPr>
+      <a:solidFill>
+        <a:schemeClr val="phClr"/>
+      </a:solidFill>
+    </cs:spPr>
+  </cs:dataPoint3D>
+  <cs:dataPointLine>
+    <cs:lnRef idx="0">
+      <cs:styleClr val="auto"/>
+    </cs:lnRef>
+    <cs:fillRef idx="1"/>
+    <cs:effectRef idx="0"/>
+    <cs:fontRef idx="minor">
+      <a:schemeClr val="tx1"/>
+    </cs:fontRef>
+    <cs:spPr>
+      <a:ln w="28575" cap="rnd">
+        <a:solidFill>
+          <a:schemeClr val="phClr"/>
+        </a:solidFill>
+        <a:round/>
+      </a:ln>
+    </cs:spPr>
+  </cs:dataPointLine>
+  <cs:dataPointMarker>
+    <cs:lnRef idx="0">
+      <cs:styleClr val="auto"/>
+    </cs:lnRef>
+    <cs:fillRef idx="1">
+      <cs:styleClr val="auto"/>
+    </cs:fillRef>
+    <cs:effectRef idx="0"/>
+    <cs:fontRef idx="minor">
+      <a:schemeClr val="tx1"/>
+    </cs:fontRef>
+    <cs:spPr>
+      <a:solidFill>
+        <a:schemeClr val="phClr"/>
+      </a:solidFill>
+      <a:ln w="9525">
+        <a:solidFill>
+          <a:schemeClr val="phClr"/>
+        </a:solidFill>
+      </a:ln>
+    </cs:spPr>
+  </cs:dataPointMarker>
+  <cs:dataPointMarkerLayout symbol="circle" size="5"/>
+  <cs:dataPointWireframe>
+    <cs:lnRef idx="0">
+      <cs:styleClr val="auto"/>
+    </cs:lnRef>
+    <cs:fillRef idx="1"/>
+    <cs:effectRef idx="0"/>
+    <cs:fontRef idx="minor">
+      <a:schemeClr val="tx1"/>
+    </cs:fontRef>
+    <cs:spPr>
+      <a:ln w="9525" cap="rnd">
+        <a:solidFill>
+          <a:schemeClr val="phClr"/>
+        </a:solidFill>
+        <a:round/>
+      </a:ln>
+    </cs:spPr>
+  </cs:dataPointWireframe>
+  <cs:dataTable>
+    <cs:lnRef idx="0"/>
+    <cs:fillRef idx="0"/>
+    <cs:effectRef idx="0"/>
+    <cs:fontRef idx="minor">
+      <a:schemeClr val="tx1">
+        <a:lumMod val="65000"/>
+        <a:lumOff val="35000"/>
+      </a:schemeClr>
+    </cs:fontRef>
+    <cs:spPr>
+      <a:noFill/>
+      <a:ln w="9525" cap="flat" cmpd="sng" algn="ctr">
+        <a:solidFill>
+          <a:schemeClr val="tx1">
+            <a:lumMod val="15000"/>
+            <a:lumOff val="85000"/>
+          </a:schemeClr>
+        </a:solidFill>
+        <a:round/>
+      </a:ln>
+    </cs:spPr>
+    <cs:defRPr sz="900" kern="1200"/>
+  </cs:dataTable>
+  <cs:downBar>
+    <cs:lnRef idx="0"/>
+    <cs:fillRef idx="0"/>
+    <cs:effectRef idx="0"/>
+    <cs:fontRef idx="minor">
+      <a:schemeClr val="dk1"/>
+    </cs:fontRef>
+    <cs:spPr>
+      <a:solidFill>
+        <a:schemeClr val="dk1">
+          <a:lumMod val="65000"/>
+          <a:lumOff val="35000"/>
+        </a:schemeClr>
+      </a:solidFill>
+      <a:ln w="9525">
+        <a:solidFill>
+          <a:schemeClr val="tx1">
+            <a:lumMod val="65000"/>
+            <a:lumOff val="35000"/>
+          </a:schemeClr>
+        </a:solidFill>
+      </a:ln>
+    </cs:spPr>
+  </cs:downBar>
+  <cs:dropLine>
+    <cs:lnRef idx="0"/>
+    <cs:fillRef idx="0"/>
+    <cs:effectRef idx="0"/>
+    <cs:fontRef idx="minor">
+      <a:schemeClr val="tx1"/>
+    </cs:fontRef>
+    <cs:spPr>
+      <a:ln w="9525" cap="flat" cmpd="sng" algn="ctr">
+        <a:solidFill>
+          <a:schemeClr val="tx1">
+            <a:lumMod val="35000"/>
+            <a:lumOff val="65000"/>
+          </a:schemeClr>
+        </a:solidFill>
+        <a:round/>
+      </a:ln>
+    </cs:spPr>
+  </cs:dropLine>
+  <cs:errorBar>
+    <cs:lnRef idx="0"/>
+    <cs:fillRef idx="0"/>
+    <cs:effectRef idx="0"/>
+    <cs:fontRef idx="minor">
+      <a:schemeClr val="tx1"/>
+    </cs:fontRef>
+    <cs:spPr>
+      <a:ln w="9525" cap="flat" cmpd="sng" algn="ctr">
+        <a:solidFill>
+          <a:schemeClr val="tx1">
+            <a:lumMod val="65000"/>
+            <a:lumOff val="35000"/>
+          </a:schemeClr>
+        </a:solidFill>
+        <a:round/>
+      </a:ln>
+    </cs:spPr>
+  </cs:errorBar>
+  <cs:floor>
+    <cs:lnRef idx="0"/>
+    <cs:fillRef idx="0"/>
+    <cs:effectRef idx="0"/>
+    <cs:fontRef idx="minor">
+      <a:schemeClr val="tx1"/>
+    </cs:fontRef>
+    <cs:spPr>
+      <a:noFill/>
+      <a:ln>
+        <a:noFill/>
+      </a:ln>
+    </cs:spPr>
+  </cs:floor>
+  <cs:gridlineMajor>
+    <cs:lnRef idx="0"/>
+    <cs:fillRef idx="0"/>
+    <cs:effectRef idx="0"/>
+    <cs:fontRef idx="minor">
+      <a:schemeClr val="tx1"/>
+    </cs:fontRef>
+    <cs:spPr>
+      <a:ln w="9525" cap="flat" cmpd="sng" algn="ctr">
+        <a:solidFill>
+          <a:schemeClr val="tx1">
+            <a:lumMod val="15000"/>
+            <a:lumOff val="85000"/>
+          </a:schemeClr>
+        </a:solidFill>
+        <a:round/>
+      </a:ln>
+    </cs:spPr>
+  </cs:gridlineMajor>
+  <cs:gridlineMinor>
+    <cs:lnRef idx="0"/>
+    <cs:fillRef idx="0"/>
+    <cs:effectRef idx="0"/>
+    <cs:fontRef idx="minor">
+      <a:schemeClr val="tx1"/>
+    </cs:fontRef>
+    <cs:spPr>
+      <a:ln w="9525" cap="flat" cmpd="sng" algn="ctr">
+        <a:solidFill>
+          <a:schemeClr val="tx1">
+            <a:lumMod val="5000"/>
+            <a:lumOff val="95000"/>
+          </a:schemeClr>
+        </a:solidFill>
+        <a:round/>
+      </a:ln>
+    </cs:spPr>
+  </cs:gridlineMinor>
+  <cs:hiLoLine>
+    <cs:lnRef idx="0"/>
+    <cs:fillRef idx="0"/>
+    <cs:effectRef idx="0"/>
+    <cs:fontRef idx="minor">
+      <a:schemeClr val="tx1"/>
+    </cs:fontRef>
+    <cs:spPr>
+      <a:ln w="9525" cap="flat" cmpd="sng" algn="ctr">
+        <a:solidFill>
+          <a:schemeClr val="tx1">
+            <a:lumMod val="75000"/>
+            <a:lumOff val="25000"/>
+          </a:schemeClr>
+        </a:solidFill>
+        <a:round/>
+      </a:ln>
+    </cs:spPr>
+  </cs:hiLoLine>
+  <cs:leaderLine>
+    <cs:lnRef idx="0"/>
+    <cs:fillRef idx="0"/>
+    <cs:effectRef idx="0"/>
+    <cs:fontRef idx="minor">
+      <a:schemeClr val="tx1"/>
+    </cs:fontRef>
+    <cs:spPr>
+      <a:ln w="9525" cap="flat" cmpd="sng" algn="ctr">
+        <a:solidFill>
+          <a:schemeClr val="tx1">
+            <a:lumMod val="35000"/>
+            <a:lumOff val="65000"/>
+          </a:schemeClr>
+        </a:solidFill>
+        <a:round/>
+      </a:ln>
+    </cs:spPr>
+  </cs:leaderLine>
+  <cs:legend>
+    <cs:lnRef idx="0"/>
+    <cs:fillRef idx="0"/>
+    <cs:effectRef idx="0"/>
+    <cs:fontRef idx="minor">
+      <a:schemeClr val="tx1">
+        <a:lumMod val="65000"/>
+        <a:lumOff val="35000"/>
+      </a:schemeClr>
+    </cs:fontRef>
+    <cs:defRPr sz="900" kern="1200"/>
+  </cs:legend>
+  <cs:plotArea mods="allowNoFillOverride allowNoLineOverride">
+    <cs:lnRef idx="0"/>
+    <cs:fillRef idx="0"/>
+    <cs:effectRef idx="0"/>
+    <cs:fontRef idx="minor">
+      <a:schemeClr val="tx1"/>
+    </cs:fontRef>
+  </cs:plotArea>
+  <cs:plotArea3D mods="allowNoFillOverride allowNoLineOverride">
+    <cs:lnRef idx="0"/>
+    <cs:fillRef idx="0"/>
+    <cs:effectRef idx="0"/>
+    <cs:fontRef idx="minor">
+      <a:schemeClr val="tx1"/>
+    </cs:fontRef>
+  </cs:plotArea3D>
+  <cs:seriesAxis>
+    <cs:lnRef idx="0"/>
+    <cs:fillRef idx="0"/>
+    <cs:effectRef idx="0"/>
+    <cs:fontRef idx="minor">
+      <a:schemeClr val="tx1">
+        <a:lumMod val="65000"/>
+        <a:lumOff val="35000"/>
+      </a:schemeClr>
+    </cs:fontRef>
+    <cs:defRPr sz="900" kern="1200"/>
+  </cs:seriesAxis>
+  <cs:seriesLine>
+    <cs:lnRef idx="0"/>
+    <cs:fillRef idx="0"/>
+    <cs:effectRef idx="0"/>
+    <cs:fontRef idx="minor">
+      <a:schemeClr val="tx1"/>
+    </cs:fontRef>
+    <cs:spPr>
+      <a:ln w="9525" cap="flat" cmpd="sng" algn="ctr">
+        <a:solidFill>
+          <a:schemeClr val="tx1">
+            <a:lumMod val="35000"/>
+            <a:lumOff val="65000"/>
+          </a:schemeClr>
+        </a:solidFill>
+        <a:round/>
+      </a:ln>
+    </cs:spPr>
+  </cs:seriesLine>
+  <cs:title>
+    <cs:lnRef idx="0"/>
+    <cs:fillRef idx="0"/>
+    <cs:effectRef idx="0"/>
+    <cs:fontRef idx="minor">
+      <a:schemeClr val="tx1">
+        <a:lumMod val="65000"/>
+        <a:lumOff val="35000"/>
+      </a:schemeClr>
+    </cs:fontRef>
+    <cs:defRPr sz="1400" b="0" kern="1200" spc="0" baseline="0"/>
+  </cs:title>
+  <cs:trendline>
+    <cs:lnRef idx="0">
+      <cs:styleClr val="auto"/>
+    </cs:lnRef>
+    <cs:fillRef idx="0"/>
+    <cs:effectRef idx="0"/>
+    <cs:fontRef idx="minor">
+      <a:schemeClr val="tx1"/>
+    </cs:fontRef>
+    <cs:spPr>
+      <a:ln w="19050" cap="rnd">
+        <a:solidFill>
+          <a:schemeClr val="phClr"/>
+        </a:solidFill>
+        <a:prstDash val="sysDot"/>
+      </a:ln>
+    </cs:spPr>
+  </cs:trendline>
+  <cs:trendlineLabel>
+    <cs:lnRef idx="0"/>
+    <cs:fillRef idx="0"/>
+    <cs:effectRef idx="0"/>
+    <cs:fontRef idx="minor">
+      <a:schemeClr val="tx1">
+        <a:lumMod val="65000"/>
+        <a:lumOff val="35000"/>
+      </a:schemeClr>
+    </cs:fontRef>
+    <cs:defRPr sz="900" kern="1200"/>
+  </cs:trendlineLabel>
+  <cs:upBar>
+    <cs:lnRef idx="0"/>
+    <cs:fillRef idx="0"/>
+    <cs:effectRef idx="0"/>
+    <cs:fontRef idx="minor">
+      <a:schemeClr val="dk1"/>
+    </cs:fontRef>
+    <cs:spPr>
+      <a:solidFill>
+        <a:schemeClr val="lt1"/>
+      </a:solidFill>
+      <a:ln w="9525">
+        <a:solidFill>
+          <a:schemeClr val="tx1">
+            <a:lumMod val="15000"/>
+            <a:lumOff val="85000"/>
+          </a:schemeClr>
+        </a:solidFill>
+      </a:ln>
+    </cs:spPr>
+  </cs:upBar>
+  <cs:valueAxis>
+    <cs:lnRef idx="0"/>
+    <cs:fillRef idx="0"/>
+    <cs:effectRef idx="0"/>
+    <cs:fontRef idx="minor">
+      <a:schemeClr val="tx1">
+        <a:lumMod val="65000"/>
+        <a:lumOff val="35000"/>
+      </a:schemeClr>
+    </cs:fontRef>
+    <cs:defRPr sz="900" kern="1200"/>
+  </cs:valueAxis>
+  <cs:wall>
+    <cs:lnRef idx="0"/>
+    <cs:fillRef idx="0"/>
+    <cs:effectRef idx="0"/>
+    <cs:fontRef idx="minor">
+      <a:schemeClr val="tx1"/>
+    </cs:fontRef>
+    <cs:spPr>
+      <a:noFill/>
+      <a:ln>
+        <a:noFill/>
+      </a:ln>
+    </cs:spPr>
+  </cs:wall>
+</cs:chartStyle>
 </file>
 
 <file path=ppt/slideLayouts/slideLayout1.xml><?xml version="1.0" encoding="utf-8"?>
@@ -238,7 +1687,7 @@
           <a:p>
             <a:fld id="{6BAE0C37-A880-4711-A186-C12F0FB08CC9}" type="datetimeFigureOut">
               <a:rPr lang="en-US" smtClean="0"/>
-              <a:t>9/12/2015</a:t>
+              <a:t>9/15/2015</a:t>
             </a:fld>
             <a:endParaRPr lang="en-US"/>
           </a:p>
@@ -408,7 +1857,7 @@
           <a:p>
             <a:fld id="{6BAE0C37-A880-4711-A186-C12F0FB08CC9}" type="datetimeFigureOut">
               <a:rPr lang="en-US" smtClean="0"/>
-              <a:t>9/12/2015</a:t>
+              <a:t>9/15/2015</a:t>
             </a:fld>
             <a:endParaRPr lang="en-US"/>
           </a:p>
@@ -588,7 +2037,7 @@
           <a:p>
             <a:fld id="{6BAE0C37-A880-4711-A186-C12F0FB08CC9}" type="datetimeFigureOut">
               <a:rPr lang="en-US" smtClean="0"/>
-              <a:t>9/12/2015</a:t>
+              <a:t>9/15/2015</a:t>
             </a:fld>
             <a:endParaRPr lang="en-US"/>
           </a:p>
@@ -758,7 +2207,7 @@
           <a:p>
             <a:fld id="{6BAE0C37-A880-4711-A186-C12F0FB08CC9}" type="datetimeFigureOut">
               <a:rPr lang="en-US" smtClean="0"/>
-              <a:t>9/12/2015</a:t>
+              <a:t>9/15/2015</a:t>
             </a:fld>
             <a:endParaRPr lang="en-US"/>
           </a:p>
@@ -1004,7 +2453,7 @@
           <a:p>
             <a:fld id="{6BAE0C37-A880-4711-A186-C12F0FB08CC9}" type="datetimeFigureOut">
               <a:rPr lang="en-US" smtClean="0"/>
-              <a:t>9/12/2015</a:t>
+              <a:t>9/15/2015</a:t>
             </a:fld>
             <a:endParaRPr lang="en-US"/>
           </a:p>
@@ -1236,7 +2685,7 @@
           <a:p>
             <a:fld id="{6BAE0C37-A880-4711-A186-C12F0FB08CC9}" type="datetimeFigureOut">
               <a:rPr lang="en-US" smtClean="0"/>
-              <a:t>9/12/2015</a:t>
+              <a:t>9/15/2015</a:t>
             </a:fld>
             <a:endParaRPr lang="en-US"/>
           </a:p>
@@ -1603,7 +3052,7 @@
           <a:p>
             <a:fld id="{6BAE0C37-A880-4711-A186-C12F0FB08CC9}" type="datetimeFigureOut">
               <a:rPr lang="en-US" smtClean="0"/>
-              <a:t>9/12/2015</a:t>
+              <a:t>9/15/2015</a:t>
             </a:fld>
             <a:endParaRPr lang="en-US"/>
           </a:p>
@@ -1721,7 +3170,7 @@
           <a:p>
             <a:fld id="{6BAE0C37-A880-4711-A186-C12F0FB08CC9}" type="datetimeFigureOut">
               <a:rPr lang="en-US" smtClean="0"/>
-              <a:t>9/12/2015</a:t>
+              <a:t>9/15/2015</a:t>
             </a:fld>
             <a:endParaRPr lang="en-US"/>
           </a:p>
@@ -1816,7 +3265,7 @@
           <a:p>
             <a:fld id="{6BAE0C37-A880-4711-A186-C12F0FB08CC9}" type="datetimeFigureOut">
               <a:rPr lang="en-US" smtClean="0"/>
-              <a:t>9/12/2015</a:t>
+              <a:t>9/15/2015</a:t>
             </a:fld>
             <a:endParaRPr lang="en-US"/>
           </a:p>
@@ -2093,7 +3542,7 @@
           <a:p>
             <a:fld id="{6BAE0C37-A880-4711-A186-C12F0FB08CC9}" type="datetimeFigureOut">
               <a:rPr lang="en-US" smtClean="0"/>
-              <a:t>9/12/2015</a:t>
+              <a:t>9/15/2015</a:t>
             </a:fld>
             <a:endParaRPr lang="en-US"/>
           </a:p>
@@ -2346,7 +3795,7 @@
           <a:p>
             <a:fld id="{6BAE0C37-A880-4711-A186-C12F0FB08CC9}" type="datetimeFigureOut">
               <a:rPr lang="en-US" smtClean="0"/>
-              <a:t>9/12/2015</a:t>
+              <a:t>9/15/2015</a:t>
             </a:fld>
             <a:endParaRPr lang="en-US"/>
           </a:p>
@@ -2559,7 +4008,7 @@
           <a:p>
             <a:fld id="{6BAE0C37-A880-4711-A186-C12F0FB08CC9}" type="datetimeFigureOut">
               <a:rPr lang="en-US" smtClean="0"/>
-              <a:t>9/12/2015</a:t>
+              <a:t>9/15/2015</a:t>
             </a:fld>
             <a:endParaRPr lang="en-US"/>
           </a:p>
@@ -3008,6 +4457,67 @@
 </p:sld>
 </file>
 
+<file path=ppt/slides/slide2.xml><?xml version="1.0" encoding="utf-8"?>
+<p:sld xmlns:a="http://schemas.openxmlformats.org/drawingml/2006/main" xmlns:r="http://schemas.openxmlformats.org/officeDocument/2006/relationships" xmlns:p="http://schemas.openxmlformats.org/presentationml/2006/main">
+  <p:cSld>
+    <p:spTree>
+      <p:nvGrpSpPr>
+        <p:cNvPr id="1" name=""/>
+        <p:cNvGrpSpPr/>
+        <p:nvPr/>
+      </p:nvGrpSpPr>
+      <p:grpSpPr>
+        <a:xfrm>
+          <a:off x="0" y="0"/>
+          <a:ext cx="0" cy="0"/>
+          <a:chOff x="0" y="0"/>
+          <a:chExt cx="0" cy="0"/>
+        </a:xfrm>
+      </p:grpSpPr>
+      <p:graphicFrame>
+        <p:nvGraphicFramePr>
+          <p:cNvPr id="5" name="Chart 4"/>
+          <p:cNvGraphicFramePr>
+            <a:graphicFrameLocks/>
+          </p:cNvGraphicFramePr>
+          <p:nvPr>
+            <p:extLst>
+              <p:ext uri="{D42A27DB-BD31-4B8C-83A1-F6EECF244321}">
+                <p14:modId xmlns:p14="http://schemas.microsoft.com/office/powerpoint/2010/main" val="3518962956"/>
+              </p:ext>
+            </p:extLst>
+          </p:nvPr>
+        </p:nvGraphicFramePr>
+        <p:xfrm>
+          <a:off x="142240" y="538480"/>
+          <a:ext cx="11907520" cy="5781040"/>
+        </p:xfrm>
+        <a:graphic>
+          <a:graphicData uri="http://schemas.openxmlformats.org/drawingml/2006/chart">
+            <c:chart xmlns:c="http://schemas.openxmlformats.org/drawingml/2006/chart" xmlns:r="http://schemas.openxmlformats.org/officeDocument/2006/relationships" r:id="rId2"/>
+          </a:graphicData>
+        </a:graphic>
+      </p:graphicFrame>
+    </p:spTree>
+    <p:extLst>
+      <p:ext uri="{BB962C8B-B14F-4D97-AF65-F5344CB8AC3E}">
+        <p14:creationId xmlns:p14="http://schemas.microsoft.com/office/powerpoint/2010/main" val="3406756034"/>
+      </p:ext>
+    </p:extLst>
+  </p:cSld>
+  <p:clrMapOvr>
+    <a:masterClrMapping/>
+  </p:clrMapOvr>
+  <p:timing>
+    <p:tnLst>
+      <p:par>
+        <p:cTn id="1" dur="indefinite" restart="never" nodeType="tmRoot"/>
+      </p:par>
+    </p:tnLst>
+  </p:timing>
+</p:sld>
+</file>
+
 <file path=ppt/theme/theme1.xml><?xml version="1.0" encoding="utf-8"?>
 <a:theme xmlns:a="http://schemas.openxmlformats.org/drawingml/2006/main" name="Office Theme">
   <a:themeElements>
@@ -3016,7 +4526,7 @@
         <a:sysClr val="windowText" lastClr="000000"/>
       </a:dk1>
       <a:lt1>
-        <a:sysClr val="window" lastClr="CCEDC7"/>
+        <a:sysClr val="window" lastClr="FFFFFF"/>
       </a:lt1>
       <a:dk2>
         <a:srgbClr val="44546A"/>

</xml_diff>